<commit_message>
updated base structure of monitor-lab
</commit_message>
<xml_diff>
--- a/..screenshots.pptx
+++ b/..screenshots.pptx
@@ -3593,10 +3593,10 @@
       </p:grpSpPr>
       <p:pic>
         <p:nvPicPr>
-          <p:cNvPr id="3" name="Picture 2">
-            <a:extLst>
-              <a:ext uri="{FF2B5EF4-FFF2-40B4-BE49-F238E27FC236}">
-                <a16:creationId xmlns:a16="http://schemas.microsoft.com/office/drawing/2014/main" id="{48E669B5-BE32-980E-1B8C-E463C200F7AD}"/>
+          <p:cNvPr id="4" name="Picture 3">
+            <a:extLst>
+              <a:ext uri="{FF2B5EF4-FFF2-40B4-BE49-F238E27FC236}">
+                <a16:creationId xmlns:a16="http://schemas.microsoft.com/office/drawing/2014/main" id="{7351801F-6C16-E348-BAA6-4B83B5E1D722}"/>
               </a:ext>
             </a:extLst>
           </p:cNvPr>

</xml_diff>

<commit_message>
added user validation at dashboard page
</commit_message>
<xml_diff>
--- a/..screenshots.pptx
+++ b/..screenshots.pptx
@@ -3413,10 +3413,10 @@
       </p:grpSpPr>
       <p:pic>
         <p:nvPicPr>
-          <p:cNvPr id="5" name="Picture 4">
-            <a:extLst>
-              <a:ext uri="{FF2B5EF4-FFF2-40B4-BE49-F238E27FC236}">
-                <a16:creationId xmlns:a16="http://schemas.microsoft.com/office/drawing/2014/main" id="{10627CE6-78CC-D657-DEB2-027648804439}"/>
+          <p:cNvPr id="3" name="Picture 2">
+            <a:extLst>
+              <a:ext uri="{FF2B5EF4-FFF2-40B4-BE49-F238E27FC236}">
+                <a16:creationId xmlns:a16="http://schemas.microsoft.com/office/drawing/2014/main" id="{012C7BDC-0F00-72AB-A140-5DE8FD3DD646}"/>
               </a:ext>
             </a:extLst>
           </p:cNvPr>
@@ -3433,8 +3433,8 @@
         </p:blipFill>
         <p:spPr>
           <a:xfrm>
-            <a:off x="0" y="323850"/>
-            <a:ext cx="12192000" cy="6210300"/>
+            <a:off x="0" y="282575"/>
+            <a:ext cx="12192000" cy="6292850"/>
           </a:xfrm>
           <a:prstGeom prst="rect">
             <a:avLst/>
@@ -3533,10 +3533,10 @@
       </p:grpSpPr>
       <p:pic>
         <p:nvPicPr>
-          <p:cNvPr id="5" name="Picture 4">
-            <a:extLst>
-              <a:ext uri="{FF2B5EF4-FFF2-40B4-BE49-F238E27FC236}">
-                <a16:creationId xmlns:a16="http://schemas.microsoft.com/office/drawing/2014/main" id="{0D60C7A8-BF06-EA43-0DFF-A978E5F74173}"/>
+          <p:cNvPr id="3" name="Picture 2">
+            <a:extLst>
+              <a:ext uri="{FF2B5EF4-FFF2-40B4-BE49-F238E27FC236}">
+                <a16:creationId xmlns:a16="http://schemas.microsoft.com/office/drawing/2014/main" id="{F8B09086-6074-EEBB-2964-FEB23042E2C8}"/>
               </a:ext>
             </a:extLst>
           </p:cNvPr>

</xml_diff>